<commit_message>
added some fancy graphes
I filled the whole slides with my grpah to please gertiser
</commit_message>
<xml_diff>
--- a/ZwischenPresäntation_RichardBritt.pptx
+++ b/ZwischenPresäntation_RichardBritt.pptx
@@ -19,7 +19,11 @@
     <p:sldId id="264" r:id="rId13"/>
     <p:sldId id="266" r:id="rId14"/>
     <p:sldId id="280" r:id="rId15"/>
-    <p:sldId id="279" r:id="rId16"/>
+    <p:sldId id="281" r:id="rId16"/>
+    <p:sldId id="279" r:id="rId17"/>
+    <p:sldId id="283" r:id="rId18"/>
+    <p:sldId id="282" r:id="rId19"/>
+    <p:sldId id="284" r:id="rId20"/>
   </p:sldIdLst>
   <p:sldSz cx="9144000" cy="6858000" type="screen4x3"/>
   <p:notesSz cx="6858000" cy="9144000"/>
@@ -140,8 +144,8 @@
 <file path=ppt/revisionInfo.xml><?xml version="1.0" encoding="utf-8"?>
 <p1510:revInfo xmlns:a="http://schemas.openxmlformats.org/drawingml/2006/main" xmlns:r="http://schemas.openxmlformats.org/officeDocument/2006/relationships" xmlns:p1510="http://schemas.microsoft.com/office/powerpoint/2015/10/main">
   <p1510:revLst>
+    <p1510:client id="{64A503E9-204D-456D-A7ED-D96CB5E7D3C1}" v="68" dt="2019-04-10T21:07:44.073"/>
     <p1510:client id="{7B9CFC24-6A95-4E88-AFBD-88113F9F429A}" v="20" dt="2019-04-10T14:20:06.489"/>
-    <p1510:client id="{64A503E9-204D-456D-A7ED-D96CB5E7D3C1}" v="68" dt="2019-04-10T21:07:44.073"/>
   </p1510:revLst>
 </p1510:revInfo>
 </file>
@@ -2166,10 +2170,10 @@
     <dgm:cxn modelId="{74620F3D-2990-4E80-ABE4-BA1C2841A0F6}" type="presOf" srcId="{EB0560BE-7114-4EC6-85E5-9064D40F7CF6}" destId="{84A8CEBD-91AF-46F1-80FA-3FB47F6EC67B}" srcOrd="1" destOrd="0" presId="urn:microsoft.com/office/officeart/2005/8/layout/orgChart1"/>
     <dgm:cxn modelId="{23FB2740-9166-412D-A9FE-C159C3E99B8B}" type="presOf" srcId="{39762DC8-33BF-4C5A-8087-429A4D897806}" destId="{E3E5C517-6009-4203-A156-0E8FFF402890}" srcOrd="0" destOrd="0" presId="urn:microsoft.com/office/officeart/2005/8/layout/orgChart1"/>
     <dgm:cxn modelId="{38BF8140-B2DA-4BE0-87C2-139921A86E00}" type="presOf" srcId="{A94A6423-635E-47CE-BC22-AEF25667E6CB}" destId="{E8434CD6-2BDD-46AC-85B7-B44293AAA257}" srcOrd="1" destOrd="0" presId="urn:microsoft.com/office/officeart/2005/8/layout/orgChart1"/>
+    <dgm:cxn modelId="{6F417347-593B-4A0B-8280-6B2A5B106839}" type="presOf" srcId="{E8CCCB15-644E-4960-84AB-DB7C5BBA784A}" destId="{4C391E49-BDC9-4B9A-9421-12FBDC13921B}" srcOrd="0" destOrd="0" presId="urn:microsoft.com/office/officeart/2005/8/layout/orgChart1"/>
     <dgm:cxn modelId="{0CBAF95D-C1A1-498B-8A1C-E87DA3267451}" srcId="{A94A6423-635E-47CE-BC22-AEF25667E6CB}" destId="{8207BF78-A23D-4134-8C93-906493E8094E}" srcOrd="0" destOrd="0" parTransId="{577DB4E7-FAB7-4E20-9162-EC5F9C24A6AB}" sibTransId="{A7F3607E-FDF4-4FE2-A0C0-3A990AE6B26E}"/>
     <dgm:cxn modelId="{1B271263-5E05-42C6-811B-BF00E4AC868B}" type="presOf" srcId="{8207BF78-A23D-4134-8C93-906493E8094E}" destId="{8E08E8BE-0386-457C-BA55-587C15F0BC54}" srcOrd="0" destOrd="0" presId="urn:microsoft.com/office/officeart/2005/8/layout/orgChart1"/>
     <dgm:cxn modelId="{F90B6B66-51FF-4CC0-B2D9-5F3DA9B28F7B}" type="presOf" srcId="{EB0560BE-7114-4EC6-85E5-9064D40F7CF6}" destId="{00DBBCB5-3A9D-4232-B041-987A45291CD1}" srcOrd="0" destOrd="0" presId="urn:microsoft.com/office/officeart/2005/8/layout/orgChart1"/>
-    <dgm:cxn modelId="{6F417347-593B-4A0B-8280-6B2A5B106839}" type="presOf" srcId="{E8CCCB15-644E-4960-84AB-DB7C5BBA784A}" destId="{4C391E49-BDC9-4B9A-9421-12FBDC13921B}" srcOrd="0" destOrd="0" presId="urn:microsoft.com/office/officeart/2005/8/layout/orgChart1"/>
     <dgm:cxn modelId="{2CF0A280-93CD-44D8-AF51-884E27CE0D8B}" type="presOf" srcId="{E8CCCB15-644E-4960-84AB-DB7C5BBA784A}" destId="{C3FA32FB-EFFD-4EBE-88F6-272A9DF9D94D}" srcOrd="1" destOrd="0" presId="urn:microsoft.com/office/officeart/2005/8/layout/orgChart1"/>
     <dgm:cxn modelId="{ACDA0781-A67A-412C-9D2C-996AE1664E07}" srcId="{8207BF78-A23D-4134-8C93-906493E8094E}" destId="{08E3F2E9-E30F-4453-8686-D0772C549260}" srcOrd="1" destOrd="0" parTransId="{462E7EC6-CA45-465F-81F4-0F9E1393D9CE}" sibTransId="{93A16123-39B6-4244-8844-AAF5C45F3C33}"/>
     <dgm:cxn modelId="{36B0DC83-6AFE-4A4E-8450-5BED19FE6C47}" type="presOf" srcId="{1693AFCE-3144-4315-9BC3-C140FDEA5902}" destId="{FF1E0416-B2FE-4B75-B3E1-3B254C296A53}" srcOrd="0" destOrd="0" presId="urn:microsoft.com/office/officeart/2005/8/layout/orgChart1"/>
@@ -5686,7 +5690,7 @@
           <a:p>
             <a:fld id="{1BA50D42-C9CD-4801-B293-61D1F53EC57E}" type="datetimeFigureOut">
               <a:rPr lang="de-DE" smtClean="0"/>
-              <a:t>10.04.2019</a:t>
+              <a:t>11.04.19</a:t>
             </a:fld>
             <a:endParaRPr lang="de-DE"/>
           </a:p>
@@ -5882,7 +5886,7 @@
           <a:p>
             <a:fld id="{1BA50D42-C9CD-4801-B293-61D1F53EC57E}" type="datetimeFigureOut">
               <a:rPr lang="de-DE" smtClean="0"/>
-              <a:t>10.04.2019</a:t>
+              <a:t>11.04.19</a:t>
             </a:fld>
             <a:endParaRPr lang="de-DE"/>
           </a:p>
@@ -6055,7 +6059,7 @@
           <a:p>
             <a:fld id="{1BA50D42-C9CD-4801-B293-61D1F53EC57E}" type="datetimeFigureOut">
               <a:rPr lang="de-DE" smtClean="0"/>
-              <a:t>10.04.2019</a:t>
+              <a:t>11.04.19</a:t>
             </a:fld>
             <a:endParaRPr lang="de-DE"/>
           </a:p>
@@ -6258,7 +6262,7 @@
           <a:p>
             <a:fld id="{1BA50D42-C9CD-4801-B293-61D1F53EC57E}" type="datetimeFigureOut">
               <a:rPr lang="de-DE" smtClean="0"/>
-              <a:t>10.04.2019</a:t>
+              <a:t>11.04.19</a:t>
             </a:fld>
             <a:endParaRPr lang="de-DE"/>
           </a:p>
@@ -6498,7 +6502,7 @@
           <a:p>
             <a:fld id="{1BA50D42-C9CD-4801-B293-61D1F53EC57E}" type="datetimeFigureOut">
               <a:rPr lang="de-DE" smtClean="0"/>
-              <a:t>10.04.2019</a:t>
+              <a:t>11.04.19</a:t>
             </a:fld>
             <a:endParaRPr lang="de-DE"/>
           </a:p>
@@ -6778,7 +6782,7 @@
           <a:p>
             <a:fld id="{1BA50D42-C9CD-4801-B293-61D1F53EC57E}" type="datetimeFigureOut">
               <a:rPr lang="de-DE" smtClean="0"/>
-              <a:t>10.04.2019</a:t>
+              <a:t>11.04.19</a:t>
             </a:fld>
             <a:endParaRPr lang="de-DE"/>
           </a:p>
@@ -7192,7 +7196,7 @@
           <a:p>
             <a:fld id="{1BA50D42-C9CD-4801-B293-61D1F53EC57E}" type="datetimeFigureOut">
               <a:rPr lang="de-DE" smtClean="0"/>
-              <a:t>10.04.2019</a:t>
+              <a:t>11.04.19</a:t>
             </a:fld>
             <a:endParaRPr lang="de-DE"/>
           </a:p>
@@ -7304,7 +7308,7 @@
           <a:p>
             <a:fld id="{1BA50D42-C9CD-4801-B293-61D1F53EC57E}" type="datetimeFigureOut">
               <a:rPr lang="de-DE" smtClean="0"/>
-              <a:t>10.04.2019</a:t>
+              <a:t>11.04.19</a:t>
             </a:fld>
             <a:endParaRPr lang="de-DE"/>
           </a:p>
@@ -7394,7 +7398,7 @@
           <a:p>
             <a:fld id="{1BA50D42-C9CD-4801-B293-61D1F53EC57E}" type="datetimeFigureOut">
               <a:rPr lang="de-DE" smtClean="0"/>
-              <a:t>10.04.2019</a:t>
+              <a:t>11.04.19</a:t>
             </a:fld>
             <a:endParaRPr lang="de-DE"/>
           </a:p>
@@ -7664,7 +7668,7 @@
           <a:p>
             <a:fld id="{1BA50D42-C9CD-4801-B293-61D1F53EC57E}" type="datetimeFigureOut">
               <a:rPr lang="de-DE" smtClean="0"/>
-              <a:t>10.04.2019</a:t>
+              <a:t>11.04.19</a:t>
             </a:fld>
             <a:endParaRPr lang="de-DE"/>
           </a:p>
@@ -7911,7 +7915,7 @@
           <a:p>
             <a:fld id="{1BA50D42-C9CD-4801-B293-61D1F53EC57E}" type="datetimeFigureOut">
               <a:rPr lang="de-DE" smtClean="0"/>
-              <a:t>10.04.2019</a:t>
+              <a:t>11.04.19</a:t>
             </a:fld>
             <a:endParaRPr lang="de-DE"/>
           </a:p>
@@ -8117,7 +8121,7 @@
           <a:p>
             <a:fld id="{1BA50D42-C9CD-4801-B293-61D1F53EC57E}" type="datetimeFigureOut">
               <a:rPr lang="de-DE" smtClean="0"/>
-              <a:t>10.04.2019</a:t>
+              <a:t>11.04.19</a:t>
             </a:fld>
             <a:endParaRPr lang="de-DE"/>
           </a:p>
@@ -9553,43 +9557,6 @@
           <a:chExt cx="0" cy="0"/>
         </a:xfrm>
       </p:grpSpPr>
-      <p:sp>
-        <p:nvSpPr>
-          <p:cNvPr id="2" name="Titel 1"/>
-          <p:cNvSpPr>
-            <a:spLocks noGrp="1"/>
-          </p:cNvSpPr>
-          <p:nvPr>
-            <p:ph type="title"/>
-          </p:nvPr>
-        </p:nvSpPr>
-        <p:spPr>
-          <a:xfrm>
-            <a:off x="457200" y="274638"/>
-            <a:ext cx="8579296" cy="994122"/>
-          </a:xfrm>
-        </p:spPr>
-        <p:txBody>
-          <a:bodyPr>
-            <a:normAutofit/>
-          </a:bodyPr>
-          <a:lstStyle/>
-          <a:p>
-            <a:pPr algn="l"/>
-            <a:r>
-              <a:rPr lang="de-CH" sz="3600" dirty="0">
-                <a:solidFill>
-                  <a:schemeClr val="accent1">
-                    <a:lumMod val="75000"/>
-                  </a:schemeClr>
-                </a:solidFill>
-                <a:ea typeface="+mn-ea"/>
-              </a:rPr>
-              <a:t>CM</a:t>
-            </a:r>
-          </a:p>
-        </p:txBody>
-      </p:sp>
       <p:pic>
         <p:nvPicPr>
           <p:cNvPr id="15" name="Inhaltsplatzhalter 14" descr="Ein Bild, das Text enthält.&#10;&#10;Mit sehr hoher Zuverlässigkeit generierte Beschreibung">
@@ -9619,47 +9586,50 @@
         </p:blipFill>
         <p:spPr>
           <a:xfrm>
-            <a:off x="179512" y="1268760"/>
-            <a:ext cx="4032448" cy="4104456"/>
+            <a:off x="1439652" y="240717"/>
+            <a:ext cx="6264696" cy="6376565"/>
           </a:xfrm>
         </p:spPr>
       </p:pic>
-      <p:pic>
-        <p:nvPicPr>
-          <p:cNvPr id="17" name="Grafik 16" descr="Ein Bild, das Text, Karte enthält.&#10;&#10;Mit sehr hoher Zuverlässigkeit generierte Beschreibung">
+      <p:sp>
+        <p:nvSpPr>
+          <p:cNvPr id="4" name="Rechteck 3">
             <a:extLst>
               <a:ext uri="{FF2B5EF4-FFF2-40B4-BE49-F238E27FC236}">
-                <a16:creationId xmlns:a16="http://schemas.microsoft.com/office/drawing/2014/main" id="{DDFD309A-E73D-4455-96D9-4C0828CB979C}"/>
+                <a16:creationId xmlns:a16="http://schemas.microsoft.com/office/drawing/2014/main" id="{21A9CB5E-559B-7548-8E4D-31E953C3019C}"/>
               </a:ext>
             </a:extLst>
           </p:cNvPr>
-          <p:cNvPicPr>
-            <a:picLocks noChangeAspect="1"/>
-          </p:cNvPicPr>
+          <p:cNvSpPr/>
           <p:nvPr/>
-        </p:nvPicPr>
-        <p:blipFill>
-          <a:blip r:embed="rId3">
-            <a:extLst>
-              <a:ext uri="{28A0092B-C50C-407E-A947-70E740481C1C}">
-                <a14:useLocalDpi xmlns:a14="http://schemas.microsoft.com/office/drawing/2010/main" val="0"/>
-              </a:ext>
-            </a:extLst>
-          </a:blip>
-          <a:stretch>
-            <a:fillRect/>
-          </a:stretch>
-        </p:blipFill>
+        </p:nvSpPr>
         <p:spPr>
           <a:xfrm>
-            <a:off x="4330556" y="1556792"/>
-            <a:ext cx="4787900" cy="3949700"/>
+            <a:off x="4066092" y="3244334"/>
+            <a:ext cx="184731" cy="646331"/>
           </a:xfrm>
           <a:prstGeom prst="rect">
             <a:avLst/>
           </a:prstGeom>
         </p:spPr>
-      </p:pic>
+        <p:txBody>
+          <a:bodyPr wrap="none">
+            <a:spAutoFit/>
+          </a:bodyPr>
+          <a:lstStyle/>
+          <a:p>
+            <a:endParaRPr lang="de-CH" dirty="0">
+              <a:latin typeface="Courier" pitchFamily="2" charset="0"/>
+            </a:endParaRPr>
+          </a:p>
+          <a:p>
+            <a:endParaRPr lang="de-CH" dirty="0">
+              <a:effectLst/>
+              <a:latin typeface="Courier" pitchFamily="2" charset="0"/>
+            </a:endParaRPr>
+          </a:p>
+        </p:txBody>
+      </p:sp>
     </p:spTree>
     <p:extLst>
       <p:ext uri="{BB962C8B-B14F-4D97-AF65-F5344CB8AC3E}">
@@ -9674,6 +9644,72 @@
 </file>
 
 <file path=ppt/slides/slide15.xml><?xml version="1.0" encoding="utf-8"?>
+<p:sld xmlns:a="http://schemas.openxmlformats.org/drawingml/2006/main" xmlns:r="http://schemas.openxmlformats.org/officeDocument/2006/relationships" xmlns:p="http://schemas.openxmlformats.org/presentationml/2006/main">
+  <p:cSld>
+    <p:spTree>
+      <p:nvGrpSpPr>
+        <p:cNvPr id="1" name=""/>
+        <p:cNvGrpSpPr/>
+        <p:nvPr/>
+      </p:nvGrpSpPr>
+      <p:grpSpPr>
+        <a:xfrm>
+          <a:off x="0" y="0"/>
+          <a:ext cx="0" cy="0"/>
+          <a:chOff x="0" y="0"/>
+          <a:chExt cx="0" cy="0"/>
+        </a:xfrm>
+      </p:grpSpPr>
+      <p:pic>
+        <p:nvPicPr>
+          <p:cNvPr id="2" name="Grafik 1">
+            <a:extLst>
+              <a:ext uri="{FF2B5EF4-FFF2-40B4-BE49-F238E27FC236}">
+                <a16:creationId xmlns:a16="http://schemas.microsoft.com/office/drawing/2014/main" id="{68E2F52A-1EA3-BD44-A623-F740955606FA}"/>
+              </a:ext>
+            </a:extLst>
+          </p:cNvPr>
+          <p:cNvPicPr>
+            <a:picLocks noChangeAspect="1"/>
+          </p:cNvPicPr>
+          <p:nvPr/>
+        </p:nvPicPr>
+        <p:blipFill>
+          <a:blip r:embed="rId2">
+            <a:extLst>
+              <a:ext uri="{28A0092B-C50C-407E-A947-70E740481C1C}">
+                <a14:useLocalDpi xmlns:a14="http://schemas.microsoft.com/office/drawing/2010/main" val="0"/>
+              </a:ext>
+            </a:extLst>
+          </a:blip>
+          <a:stretch>
+            <a:fillRect/>
+          </a:stretch>
+        </p:blipFill>
+        <p:spPr>
+          <a:xfrm>
+            <a:off x="0" y="-81529"/>
+            <a:ext cx="9144000" cy="7021057"/>
+          </a:xfrm>
+          <a:prstGeom prst="rect">
+            <a:avLst/>
+          </a:prstGeom>
+        </p:spPr>
+      </p:pic>
+    </p:spTree>
+    <p:extLst>
+      <p:ext uri="{BB962C8B-B14F-4D97-AF65-F5344CB8AC3E}">
+        <p14:creationId xmlns:p14="http://schemas.microsoft.com/office/powerpoint/2010/main" val="4106748518"/>
+      </p:ext>
+    </p:extLst>
+  </p:cSld>
+  <p:clrMapOvr>
+    <a:masterClrMapping/>
+  </p:clrMapOvr>
+</p:sld>
+</file>
+
+<file path=ppt/slides/slide16.xml><?xml version="1.0" encoding="utf-8"?>
 <p:sld xmlns:a="http://schemas.openxmlformats.org/drawingml/2006/main" xmlns:r="http://schemas.openxmlformats.org/officeDocument/2006/relationships" xmlns:p="http://schemas.openxmlformats.org/presentationml/2006/main">
   <p:cSld>
     <p:spTree>
@@ -9771,6 +9807,156 @@
     <p:extLst>
       <p:ext uri="{BB962C8B-B14F-4D97-AF65-F5344CB8AC3E}">
         <p14:creationId xmlns:p14="http://schemas.microsoft.com/office/powerpoint/2010/main" val="1855751221"/>
+      </p:ext>
+    </p:extLst>
+  </p:cSld>
+  <p:clrMapOvr>
+    <a:masterClrMapping/>
+  </p:clrMapOvr>
+</p:sld>
+</file>
+
+<file path=ppt/slides/slide17.xml><?xml version="1.0" encoding="utf-8"?>
+<p:sld xmlns:a="http://schemas.openxmlformats.org/drawingml/2006/main" xmlns:r="http://schemas.openxmlformats.org/officeDocument/2006/relationships" xmlns:p="http://schemas.openxmlformats.org/presentationml/2006/main">
+  <p:cSld>
+    <p:spTree>
+      <p:nvGrpSpPr>
+        <p:cNvPr id="1" name=""/>
+        <p:cNvGrpSpPr/>
+        <p:nvPr/>
+      </p:nvGrpSpPr>
+      <p:grpSpPr>
+        <a:xfrm>
+          <a:off x="0" y="0"/>
+          <a:ext cx="0" cy="0"/>
+          <a:chOff x="0" y="0"/>
+          <a:chExt cx="0" cy="0"/>
+        </a:xfrm>
+      </p:grpSpPr>
+      <p:pic>
+        <p:nvPicPr>
+          <p:cNvPr id="2" name="Grafik 1">
+            <a:extLst>
+              <a:ext uri="{FF2B5EF4-FFF2-40B4-BE49-F238E27FC236}">
+                <a16:creationId xmlns:a16="http://schemas.microsoft.com/office/drawing/2014/main" id="{154F09E2-CAA5-604E-9785-FA8145640106}"/>
+              </a:ext>
+            </a:extLst>
+          </p:cNvPr>
+          <p:cNvPicPr>
+            <a:picLocks noChangeAspect="1"/>
+          </p:cNvPicPr>
+          <p:nvPr/>
+        </p:nvPicPr>
+        <p:blipFill>
+          <a:blip r:embed="rId2"/>
+          <a:stretch>
+            <a:fillRect/>
+          </a:stretch>
+        </p:blipFill>
+        <p:spPr>
+          <a:xfrm>
+            <a:off x="1479550" y="152400"/>
+            <a:ext cx="6184900" cy="6553200"/>
+          </a:xfrm>
+          <a:prstGeom prst="rect">
+            <a:avLst/>
+          </a:prstGeom>
+        </p:spPr>
+      </p:pic>
+    </p:spTree>
+    <p:extLst>
+      <p:ext uri="{BB962C8B-B14F-4D97-AF65-F5344CB8AC3E}">
+        <p14:creationId xmlns:p14="http://schemas.microsoft.com/office/powerpoint/2010/main" val="3842580984"/>
+      </p:ext>
+    </p:extLst>
+  </p:cSld>
+  <p:clrMapOvr>
+    <a:masterClrMapping/>
+  </p:clrMapOvr>
+</p:sld>
+</file>
+
+<file path=ppt/slides/slide18.xml><?xml version="1.0" encoding="utf-8"?>
+<p:sld xmlns:a="http://schemas.openxmlformats.org/drawingml/2006/main" xmlns:r="http://schemas.openxmlformats.org/officeDocument/2006/relationships" xmlns:p="http://schemas.openxmlformats.org/presentationml/2006/main">
+  <p:cSld>
+    <p:spTree>
+      <p:nvGrpSpPr>
+        <p:cNvPr id="1" name=""/>
+        <p:cNvGrpSpPr/>
+        <p:nvPr/>
+      </p:nvGrpSpPr>
+      <p:grpSpPr>
+        <a:xfrm>
+          <a:off x="0" y="0"/>
+          <a:ext cx="0" cy="0"/>
+          <a:chOff x="0" y="0"/>
+          <a:chExt cx="0" cy="0"/>
+        </a:xfrm>
+      </p:grpSpPr>
+      <p:pic>
+        <p:nvPicPr>
+          <p:cNvPr id="2" name="Grafik 1">
+            <a:extLst>
+              <a:ext uri="{FF2B5EF4-FFF2-40B4-BE49-F238E27FC236}">
+                <a16:creationId xmlns:a16="http://schemas.microsoft.com/office/drawing/2014/main" id="{83548C80-0A35-224B-B96D-E7339CABA560}"/>
+              </a:ext>
+            </a:extLst>
+          </p:cNvPr>
+          <p:cNvPicPr>
+            <a:picLocks noChangeAspect="1"/>
+          </p:cNvPicPr>
+          <p:nvPr/>
+        </p:nvPicPr>
+        <p:blipFill>
+          <a:blip r:embed="rId2"/>
+          <a:stretch>
+            <a:fillRect/>
+          </a:stretch>
+        </p:blipFill>
+        <p:spPr>
+          <a:xfrm>
+            <a:off x="-327401" y="0"/>
+            <a:ext cx="9798804" cy="6858000"/>
+          </a:xfrm>
+          <a:prstGeom prst="rect">
+            <a:avLst/>
+          </a:prstGeom>
+        </p:spPr>
+      </p:pic>
+    </p:spTree>
+    <p:extLst>
+      <p:ext uri="{BB962C8B-B14F-4D97-AF65-F5344CB8AC3E}">
+        <p14:creationId xmlns:p14="http://schemas.microsoft.com/office/powerpoint/2010/main" val="3625878505"/>
+      </p:ext>
+    </p:extLst>
+  </p:cSld>
+  <p:clrMapOvr>
+    <a:masterClrMapping/>
+  </p:clrMapOvr>
+</p:sld>
+</file>
+
+<file path=ppt/slides/slide19.xml><?xml version="1.0" encoding="utf-8"?>
+<p:sld xmlns:a="http://schemas.openxmlformats.org/drawingml/2006/main" xmlns:r="http://schemas.openxmlformats.org/officeDocument/2006/relationships" xmlns:p="http://schemas.openxmlformats.org/presentationml/2006/main">
+  <p:cSld>
+    <p:spTree>
+      <p:nvGrpSpPr>
+        <p:cNvPr id="1" name=""/>
+        <p:cNvGrpSpPr/>
+        <p:nvPr/>
+      </p:nvGrpSpPr>
+      <p:grpSpPr>
+        <a:xfrm>
+          <a:off x="0" y="0"/>
+          <a:ext cx="0" cy="0"/>
+          <a:chOff x="0" y="0"/>
+          <a:chExt cx="0" cy="0"/>
+        </a:xfrm>
+      </p:grpSpPr>
+    </p:spTree>
+    <p:extLst>
+      <p:ext uri="{BB962C8B-B14F-4D97-AF65-F5344CB8AC3E}">
+        <p14:creationId xmlns:p14="http://schemas.microsoft.com/office/powerpoint/2010/main" val="1706361023"/>
       </p:ext>
     </p:extLst>
   </p:cSld>

</xml_diff>